<commit_message>
add mem scale notes
</commit_message>
<xml_diff>
--- a/explore/novel/notes/MEMNotes.pptx
+++ b/explore/novel/notes/MEMNotes.pptx
@@ -7,7 +7,8 @@
   <p:sldIdLst>
     <p:sldId id="256" r:id="rId2"/>
     <p:sldId id="258" r:id="rId3"/>
-    <p:sldId id="257" r:id="rId4"/>
+    <p:sldId id="259" r:id="rId4"/>
+    <p:sldId id="257" r:id="rId5"/>
   </p:sldIdLst>
   <p:sldSz cx="12192000" cy="6858000"/>
   <p:notesSz cx="6858000" cy="9144000"/>
@@ -106,6 +107,11 @@
       </a:defRPr>
     </a:lvl9pPr>
   </p:defaultTextStyle>
+  <p:extLst>
+    <p:ext uri="{EFAFB233-063F-42B5-8137-9DF3F51BA10A}">
+      <p15:sldGuideLst xmlns:p15="http://schemas.microsoft.com/office/powerpoint/2012/main"/>
+    </p:ext>
+  </p:extLst>
 </p:presentation>
 </file>
 
@@ -3600,6 +3606,152 @@
         </p:nvSpPr>
         <p:spPr/>
         <p:txBody>
+          <a:bodyPr>
+            <a:normAutofit/>
+          </a:bodyPr>
+          <a:lstStyle/>
+          <a:p>
+            <a:r>
+              <a:rPr lang="en-US" dirty="0"/>
+              <a:t>MEM score</a:t>
+            </a:r>
+          </a:p>
+        </p:txBody>
+      </p:sp>
+      <p:sp>
+        <p:nvSpPr>
+          <p:cNvPr id="9" name="TextBox 8">
+            <a:extLst>
+              <a:ext uri="{FF2B5EF4-FFF2-40B4-BE49-F238E27FC236}">
+                <a16:creationId xmlns:a16="http://schemas.microsoft.com/office/drawing/2014/main" id="{AC30C7DF-188E-8A45-B524-12ABE3512A17}"/>
+              </a:ext>
+            </a:extLst>
+          </p:cNvPr>
+          <p:cNvSpPr txBox="1"/>
+          <p:nvPr/>
+        </p:nvSpPr>
+        <p:spPr>
+          <a:xfrm>
+            <a:off x="2786744" y="5432455"/>
+            <a:ext cx="6411686" cy="369332"/>
+          </a:xfrm>
+          <a:prstGeom prst="rect">
+            <a:avLst/>
+          </a:prstGeom>
+          <a:noFill/>
+        </p:spPr>
+        <p:txBody>
+          <a:bodyPr wrap="square" rtlCol="0">
+            <a:spAutoFit/>
+          </a:bodyPr>
+          <a:lstStyle/>
+          <a:p>
+            <a:r>
+              <a:rPr lang="en-US" dirty="0"/>
+              <a:t>https://</a:t>
+            </a:r>
+            <a:r>
+              <a:rPr lang="en-US" dirty="0" err="1"/>
+              <a:t>www.ncbi.nlm.nih.gov</a:t>
+            </a:r>
+            <a:r>
+              <a:rPr lang="en-US" dirty="0"/>
+              <a:t>/</a:t>
+            </a:r>
+            <a:r>
+              <a:rPr lang="en-US" dirty="0" err="1"/>
+              <a:t>pmc</a:t>
+            </a:r>
+            <a:r>
+              <a:rPr lang="en-US" dirty="0"/>
+              <a:t>/articles/PMC5330853/</a:t>
+            </a:r>
+          </a:p>
+        </p:txBody>
+      </p:sp>
+      <p:sp>
+        <p:nvSpPr>
+          <p:cNvPr id="5" name="TextBox 4">
+            <a:extLst>
+              <a:ext uri="{FF2B5EF4-FFF2-40B4-BE49-F238E27FC236}">
+                <a16:creationId xmlns:a16="http://schemas.microsoft.com/office/drawing/2014/main" id="{54F57630-3118-8547-858C-9C5B5741E5DF}"/>
+              </a:ext>
+            </a:extLst>
+          </p:cNvPr>
+          <p:cNvSpPr txBox="1"/>
+          <p:nvPr/>
+        </p:nvSpPr>
+        <p:spPr>
+          <a:xfrm>
+            <a:off x="1045029" y="1883228"/>
+            <a:ext cx="7935685" cy="1477328"/>
+          </a:xfrm>
+          <a:prstGeom prst="rect">
+            <a:avLst/>
+          </a:prstGeom>
+          <a:noFill/>
+        </p:spPr>
+        <p:txBody>
+          <a:bodyPr wrap="square" rtlCol="0">
+            <a:spAutoFit/>
+          </a:bodyPr>
+          <a:lstStyle/>
+          <a:p>
+            <a:r>
+              <a:rPr lang="en-US" dirty="0"/>
+              <a:t>The + or − value provided along with the marker name is converted to a −10 to +10 scale and rounded to the nearest integer. As implemented here, the maximum of the scale was set using the highest absolute value MEM score observed across all markers and populations. All values in the matrix are divided by this maximum value and multiplied by 10 to achieve the −10 to +10 scaling. </a:t>
+            </a:r>
+          </a:p>
+        </p:txBody>
+      </p:sp>
+    </p:spTree>
+    <p:extLst>
+      <p:ext uri="{BB962C8B-B14F-4D97-AF65-F5344CB8AC3E}">
+        <p14:creationId xmlns:p14="http://schemas.microsoft.com/office/powerpoint/2010/main" val="436155622"/>
+      </p:ext>
+    </p:extLst>
+  </p:cSld>
+  <p:clrMapOvr>
+    <a:masterClrMapping/>
+  </p:clrMapOvr>
+</p:sld>
+</file>
+
+<file path=ppt/slides/slide4.xml><?xml version="1.0" encoding="utf-8"?>
+<p:sld xmlns:a="http://schemas.openxmlformats.org/drawingml/2006/main" xmlns:r="http://schemas.openxmlformats.org/officeDocument/2006/relationships" xmlns:p="http://schemas.openxmlformats.org/presentationml/2006/main">
+  <p:cSld>
+    <p:spTree>
+      <p:nvGrpSpPr>
+        <p:cNvPr id="1" name=""/>
+        <p:cNvGrpSpPr/>
+        <p:nvPr/>
+      </p:nvGrpSpPr>
+      <p:grpSpPr>
+        <a:xfrm>
+          <a:off x="0" y="0"/>
+          <a:ext cx="0" cy="0"/>
+          <a:chOff x="0" y="0"/>
+          <a:chExt cx="0" cy="0"/>
+        </a:xfrm>
+      </p:grpSpPr>
+      <p:sp>
+        <p:nvSpPr>
+          <p:cNvPr id="2" name="Title 1">
+            <a:extLst>
+              <a:ext uri="{FF2B5EF4-FFF2-40B4-BE49-F238E27FC236}">
+                <a16:creationId xmlns:a16="http://schemas.microsoft.com/office/drawing/2014/main" id="{A9455F9A-D927-DB42-A683-D98DF2D59C17}"/>
+              </a:ext>
+            </a:extLst>
+          </p:cNvPr>
+          <p:cNvSpPr>
+            <a:spLocks noGrp="1"/>
+          </p:cNvSpPr>
+          <p:nvPr>
+            <p:ph type="title"/>
+          </p:nvPr>
+        </p:nvSpPr>
+        <p:spPr/>
+        <p:txBody>
           <a:bodyPr/>
           <a:lstStyle/>
           <a:p>

</xml_diff>